<commit_message>
update webCrawling project files
</commit_message>
<xml_diff>
--- a/Python WebCrawling/PYTHON을 이용한  웹크롤링 분석.pptx
+++ b/Python WebCrawling/PYTHON을 이용한  웹크롤링 분석.pptx
@@ -2,7 +2,7 @@
 <file path=ppt/presentation.xml><?xml version="1.0" encoding="utf-8"?>
 <p:presentation xmlns:r="http://schemas.openxmlformats.org/officeDocument/2006/relationships" xmlns:c="http://schemas.openxmlformats.org/drawingml/2006/chart" xmlns:a="http://schemas.openxmlformats.org/drawingml/2006/main" xmlns:dgm="http://schemas.openxmlformats.org/drawingml/2006/diagram" xmlns:dsp="http://schemas.microsoft.com/office/drawing/2008/diagram" xmlns:p="http://schemas.openxmlformats.org/presentationml/2006/main" saveSubsetFonts="1">
   <p:sldMasterIdLst>
-    <p:sldMasterId id="2147483732" r:id="rId1"/>
+    <p:sldMasterId id="2147483731" r:id="rId1"/>
   </p:sldMasterIdLst>
   <p:notesMasterIdLst>
     <p:notesMasterId r:id="rId2"/>
@@ -222,7 +222,7 @@
               <a:pPr lvl="0">
                 <a:defRPr/>
               </a:pPr>
-              <a:t>2023-01-06</a:t>
+              <a:t>2023-02-07</a:t>
             </a:fld>
             <a:endParaRPr lang="ko-KR" altLang="en-US"/>
           </a:p>
@@ -9454,7 +9454,7 @@
 </file>
 
 <file path=ppt/slides/slide12.xml><?xml version="1.0" encoding="utf-8"?>
-<p:sld xmlns:a="http://schemas.openxmlformats.org/drawingml/2006/main" xmlns:r="http://schemas.openxmlformats.org/officeDocument/2006/relationships" xmlns:p="http://schemas.openxmlformats.org/presentationml/2006/main">
+<p:sld xmlns:r="http://schemas.openxmlformats.org/officeDocument/2006/relationships" xmlns:c="http://schemas.openxmlformats.org/drawingml/2006/chart" xmlns:a="http://schemas.openxmlformats.org/drawingml/2006/main" xmlns:dgm="http://schemas.openxmlformats.org/drawingml/2006/diagram" xmlns:dsp="http://schemas.microsoft.com/office/drawing/2008/diagram" xmlns:p="http://schemas.openxmlformats.org/presentationml/2006/main">
   <p:cSld>
     <p:spTree>
       <p:nvGrpSpPr>
@@ -9477,7 +9477,7 @@
             <a:spLocks noGrp="1"/>
           </p:cNvSpPr>
           <p:nvPr>
-            <p:ph type="title"/>
+            <p:ph type="title" idx="0"/>
           </p:nvPr>
         </p:nvSpPr>
         <p:spPr>
@@ -9497,6 +9497,7 @@
               <a:rPr lang="ko-KR" altLang="en-US"/>
               <a:t>웹 크롤링 응용</a:t>
             </a:r>
+            <a:endParaRPr lang="ko-KR" altLang="en-US"/>
           </a:p>
         </p:txBody>
       </p:sp>
@@ -9558,12 +9559,13 @@
               <a:rPr lang="ko-KR" altLang="en-US"/>
               <a:t>엑셀 출력 결과</a:t>
             </a:r>
+            <a:endParaRPr lang="ko-KR" altLang="en-US"/>
           </a:p>
         </p:txBody>
       </p:sp>
       <p:pic>
         <p:nvPicPr>
-          <p:cNvPr id="15" name="그림 14"/>
+          <p:cNvPr id="16" name=""/>
           <p:cNvPicPr>
             <a:picLocks noChangeAspect="1"/>
           </p:cNvPicPr>
@@ -9577,8 +9579,8 @@
         </p:blipFill>
         <p:spPr>
           <a:xfrm>
-            <a:off x="1005516" y="2466569"/>
-            <a:ext cx="6304609" cy="1430640"/>
+            <a:off x="1005516" y="2561731"/>
+            <a:ext cx="9348649" cy="1240315"/>
           </a:xfrm>
           <a:prstGeom prst="rect">
             <a:avLst/>
@@ -9590,11 +9592,11 @@
   <p:clrMapOvr>
     <a:masterClrMapping/>
   </p:clrMapOvr>
-  <mc:AlternateContent xmlns:mc="http://schemas.openxmlformats.org/markup-compatibility/2006" xmlns:p14="http://schemas.microsoft.com/office/powerpoint/2010/main">
-    <mc:Choice Requires="p14">
-      <p:transition/>
+  <mc:AlternateContent xmlns:mc="http://schemas.openxmlformats.org/markup-compatibility/2006">
+    <mc:Choice xmlns:p14="http://schemas.microsoft.com/office/powerpoint/2010/main" Requires="p14">
+      <p:transition xmlns:mc="http://schemas.openxmlformats.org/markup-compatibility/2006" xmlns:p14="http://schemas.microsoft.com/office/powerpoint/2010/main" mc:Ignorable="p14" p14:dur="500"/>
     </mc:Choice>
-    <mc:Fallback xmlns="" xmlns:c="http://schemas.openxmlformats.org/drawingml/2006/chart" xmlns:dgm="http://schemas.openxmlformats.org/drawingml/2006/diagram" xmlns:dsp="http://schemas.microsoft.com/office/drawing/2008/diagram">
+    <mc:Fallback>
       <p:transition/>
     </mc:Fallback>
   </mc:AlternateContent>
@@ -9806,7 +9808,7 @@
 </file>
 
 <file path=ppt/slides/slide14.xml><?xml version="1.0" encoding="utf-8"?>
-<p:sld xmlns:a="http://schemas.openxmlformats.org/drawingml/2006/main" xmlns:r="http://schemas.openxmlformats.org/officeDocument/2006/relationships" xmlns:p="http://schemas.openxmlformats.org/presentationml/2006/main">
+<p:sld xmlns:r="http://schemas.openxmlformats.org/officeDocument/2006/relationships" xmlns:c="http://schemas.openxmlformats.org/drawingml/2006/chart" xmlns:a="http://schemas.openxmlformats.org/drawingml/2006/main" xmlns:dgm="http://schemas.openxmlformats.org/drawingml/2006/diagram" xmlns:dsp="http://schemas.microsoft.com/office/drawing/2008/diagram" xmlns:p="http://schemas.openxmlformats.org/presentationml/2006/main">
   <p:cSld>
     <p:spTree>
       <p:nvGrpSpPr>
@@ -9829,7 +9831,7 @@
             <a:spLocks noGrp="1"/>
           </p:cNvSpPr>
           <p:nvPr>
-            <p:ph type="title"/>
+            <p:ph type="title" idx="0"/>
           </p:nvPr>
         </p:nvSpPr>
         <p:spPr>
@@ -9846,17 +9848,10 @@
               <a:defRPr/>
             </a:pPr>
             <a:r>
-              <a:rPr lang="ko-KR" altLang="en-US" dirty="0"/>
-              <a:t>웹 </a:t>
-            </a:r>
-            <a:r>
-              <a:rPr lang="ko-KR" altLang="en-US" dirty="0" err="1"/>
-              <a:t>크롤링</a:t>
-            </a:r>
-            <a:r>
-              <a:rPr lang="ko-KR" altLang="en-US" dirty="0"/>
-              <a:t> 응용</a:t>
-            </a:r>
+              <a:rPr lang="ko-KR" altLang="en-US"/>
+              <a:t>웹 크롤링 응용</a:t>
+            </a:r>
+            <a:endParaRPr lang="ko-KR" altLang="en-US"/>
           </a:p>
         </p:txBody>
       </p:sp>
@@ -9879,26 +9874,20 @@
               <a:buNone/>
               <a:defRPr/>
             </a:pPr>
-            <a:endParaRPr lang="ko-KR" altLang="en-US" dirty="0"/>
+            <a:endParaRPr lang="ko-KR" altLang="en-US"/>
           </a:p>
           <a:p>
             <a:pPr>
               <a:buNone/>
               <a:defRPr/>
             </a:pPr>
-            <a:endParaRPr lang="ko-KR" altLang="en-US" dirty="0"/>
-          </a:p>
-        </p:txBody>
-      </p:sp>
-      <p:sp>
-        <p:nvSpPr>
-          <p:cNvPr id="8" name="TextBox 7">
-            <a:extLst>
-              <a:ext uri="{FF2B5EF4-FFF2-40B4-BE49-F238E27FC236}">
-                <a16:creationId xmlns:a16="http://schemas.microsoft.com/office/drawing/2014/main" id="{31B20383-8915-53E7-C7B2-E588CF30F4DF}"/>
-              </a:ext>
-            </a:extLst>
-          </p:cNvPr>
+            <a:endParaRPr lang="ko-KR" altLang="en-US"/>
+          </a:p>
+        </p:txBody>
+      </p:sp>
+      <p:sp>
+        <p:nvSpPr>
+          <p:cNvPr id="8" name="TextBox 7"/>
           <p:cNvSpPr txBox="1"/>
           <p:nvPr/>
         </p:nvSpPr>
@@ -9913,48 +9902,40 @@
           <a:noFill/>
         </p:spPr>
         <p:txBody>
-          <a:bodyPr wrap="square" rtlCol="0">
+          <a:bodyPr wrap="square">
             <a:spAutoFit/>
           </a:bodyPr>
           <a:lstStyle/>
           <a:p>
-            <a:r>
-              <a:rPr lang="ko-KR" altLang="en-US" dirty="0"/>
+            <a:pPr lvl="0">
+              <a:defRPr/>
+            </a:pPr>
+            <a:r>
+              <a:rPr lang="ko-KR" altLang="en-US"/>
               <a:t>자료 가져오기</a:t>
             </a:r>
+            <a:endParaRPr lang="ko-KR" altLang="en-US"/>
           </a:p>
         </p:txBody>
       </p:sp>
       <p:pic>
         <p:nvPicPr>
-          <p:cNvPr id="14" name="그림 13">
-            <a:extLst>
-              <a:ext uri="{FF2B5EF4-FFF2-40B4-BE49-F238E27FC236}">
-                <a16:creationId xmlns:a16="http://schemas.microsoft.com/office/drawing/2014/main" id="{7DE2BE21-50FB-452F-0C81-A1D13779C476}"/>
-              </a:ext>
-            </a:extLst>
-          </p:cNvPr>
+          <p:cNvPr id="15" name=""/>
           <p:cNvPicPr>
             <a:picLocks noChangeAspect="1"/>
           </p:cNvPicPr>
           <p:nvPr/>
         </p:nvPicPr>
-        <p:blipFill>
-          <a:blip r:embed="rId2">
-            <a:extLst>
-              <a:ext uri="{28A0092B-C50C-407E-A947-70E740481C1C}">
-                <a14:useLocalDpi xmlns:a14="http://schemas.microsoft.com/office/drawing/2010/main" val="0"/>
-              </a:ext>
-            </a:extLst>
-          </a:blip>
+        <p:blipFill rotWithShape="1">
+          <a:blip r:embed="rId2"/>
           <a:stretch>
             <a:fillRect/>
           </a:stretch>
         </p:blipFill>
         <p:spPr>
           <a:xfrm>
-            <a:off x="394492" y="2190577"/>
-            <a:ext cx="11403016" cy="2935338"/>
+            <a:off x="0" y="2031840"/>
+            <a:ext cx="12192000" cy="3937342"/>
           </a:xfrm>
           <a:prstGeom prst="rect">
             <a:avLst/>
@@ -9963,66 +9944,13 @@
       </p:pic>
       <p:sp>
         <p:nvSpPr>
-          <p:cNvPr id="11" name="TextBox 10">
-            <a:extLst>
-              <a:ext uri="{FF2B5EF4-FFF2-40B4-BE49-F238E27FC236}">
-                <a16:creationId xmlns:a16="http://schemas.microsoft.com/office/drawing/2014/main" id="{9B7823FA-0385-1AFD-354E-9B9F1C3BD207}"/>
-              </a:ext>
-            </a:extLst>
-          </p:cNvPr>
+          <p:cNvPr id="9" name="TextBox 8"/>
           <p:cNvSpPr txBox="1"/>
           <p:nvPr/>
         </p:nvSpPr>
         <p:spPr>
           <a:xfrm>
-            <a:off x="7339712" y="3121861"/>
-            <a:ext cx="4026876" cy="369332"/>
-          </a:xfrm>
-          <a:prstGeom prst="rect">
-            <a:avLst/>
-          </a:prstGeom>
-          <a:noFill/>
-        </p:spPr>
-        <p:txBody>
-          <a:bodyPr wrap="square" rtlCol="0">
-            <a:spAutoFit/>
-          </a:bodyPr>
-          <a:lstStyle/>
-          <a:p>
-            <a:r>
-              <a:rPr lang="en-US" altLang="ko-KR" dirty="0"/>
-              <a:t>{</a:t>
-            </a:r>
-            <a:r>
-              <a:rPr lang="en-US" altLang="ko-KR" dirty="0" err="1"/>
-              <a:t>insu</a:t>
-            </a:r>
-            <a:r>
-              <a:rPr lang="en-US" altLang="ko-KR" dirty="0"/>
-              <a:t>}</a:t>
-            </a:r>
-            <a:r>
-              <a:rPr lang="ko-KR" altLang="en-US" dirty="0"/>
-              <a:t>에 보험료 입력</a:t>
-            </a:r>
-          </a:p>
-        </p:txBody>
-      </p:sp>
-      <p:sp>
-        <p:nvSpPr>
-          <p:cNvPr id="9" name="TextBox 8">
-            <a:extLst>
-              <a:ext uri="{FF2B5EF4-FFF2-40B4-BE49-F238E27FC236}">
-                <a16:creationId xmlns:a16="http://schemas.microsoft.com/office/drawing/2014/main" id="{E40AFA60-915D-78E9-E539-D0BBB8A3FFF4}"/>
-              </a:ext>
-            </a:extLst>
-          </p:cNvPr>
-          <p:cNvSpPr txBox="1"/>
-          <p:nvPr/>
-        </p:nvSpPr>
-        <p:spPr>
-          <a:xfrm>
-            <a:off x="1459671" y="2657469"/>
+            <a:off x="1223912" y="2412958"/>
             <a:ext cx="5002823" cy="369332"/>
           </a:xfrm>
           <a:prstGeom prst="rect">
@@ -10031,29 +9959,70 @@
           <a:noFill/>
         </p:spPr>
         <p:txBody>
-          <a:bodyPr wrap="square" rtlCol="0">
+          <a:bodyPr wrap="square">
             <a:spAutoFit/>
           </a:bodyPr>
           <a:lstStyle/>
           <a:p>
-            <a:r>
-              <a:rPr lang="en-US" altLang="ko-KR" dirty="0">
-                <a:sym typeface="Wingdings" panose="05000000000000000000" pitchFamily="2" charset="2"/>
+            <a:pPr lvl="0">
+              <a:defRPr/>
+            </a:pPr>
+            <a:r>
+              <a:rPr lang="en-US" altLang="ko-KR">
+                <a:sym typeface="Wingdings"/>
               </a:rPr>
               <a:t></a:t>
             </a:r>
             <a:r>
-              <a:rPr lang="ko-KR" altLang="en-US" dirty="0"/>
+              <a:rPr lang="ko-KR" altLang="en-US"/>
               <a:t>함수 </a:t>
             </a:r>
             <a:r>
-              <a:rPr lang="en-US" altLang="ko-KR" dirty="0"/>
+              <a:rPr lang="en-US" altLang="ko-KR"/>
               <a:t>def </a:t>
             </a:r>
             <a:r>
-              <a:rPr lang="ko-KR" altLang="en-US" dirty="0"/>
+              <a:rPr lang="ko-KR" altLang="en-US"/>
               <a:t>사용  </a:t>
             </a:r>
+            <a:endParaRPr lang="ko-KR" altLang="en-US"/>
+          </a:p>
+        </p:txBody>
+      </p:sp>
+      <p:sp>
+        <p:nvSpPr>
+          <p:cNvPr id="11" name="TextBox 10"/>
+          <p:cNvSpPr txBox="1"/>
+          <p:nvPr/>
+        </p:nvSpPr>
+        <p:spPr>
+          <a:xfrm>
+            <a:off x="7832648" y="2415158"/>
+            <a:ext cx="4026876" cy="367132"/>
+          </a:xfrm>
+          <a:prstGeom prst="rect">
+            <a:avLst/>
+          </a:prstGeom>
+          <a:noFill/>
+        </p:spPr>
+        <p:txBody>
+          <a:bodyPr wrap="square">
+            <a:spAutoFit/>
+          </a:bodyPr>
+          <a:lstStyle/>
+          <a:p>
+            <a:pPr lvl="0">
+              <a:defRPr/>
+            </a:pPr>
+            <a:r>
+              <a:rPr lang="en-US" altLang="ko-KR"/>
+              <a:t>{insu}</a:t>
+            </a:r>
+            <a:r>
+              <a:rPr lang="ko-KR" altLang="en-US"/>
+              <a:t>에 보험료 입력</a:t>
+            </a:r>
+            <a:endParaRPr lang="ko-KR" altLang="en-US"/>
           </a:p>
         </p:txBody>
       </p:sp>
@@ -10062,11 +10031,11 @@
   <p:clrMapOvr>
     <a:masterClrMapping/>
   </p:clrMapOvr>
-  <mc:AlternateContent xmlns:mc="http://schemas.openxmlformats.org/markup-compatibility/2006" xmlns:p14="http://schemas.microsoft.com/office/powerpoint/2010/main">
-    <mc:Choice Requires="p14">
-      <p:transition/>
+  <mc:AlternateContent xmlns:mc="http://schemas.openxmlformats.org/markup-compatibility/2006">
+    <mc:Choice xmlns:p14="http://schemas.microsoft.com/office/powerpoint/2010/main" Requires="p14">
+      <p:transition xmlns:mc="http://schemas.openxmlformats.org/markup-compatibility/2006" xmlns:p14="http://schemas.microsoft.com/office/powerpoint/2010/main" mc:Ignorable="p14" p14:dur="500"/>
     </mc:Choice>
-    <mc:Fallback xmlns="" xmlns:c="http://schemas.openxmlformats.org/drawingml/2006/chart" xmlns:dgm="http://schemas.openxmlformats.org/drawingml/2006/diagram" xmlns:dsp="http://schemas.microsoft.com/office/drawing/2008/diagram">
+    <mc:Fallback>
       <p:transition/>
     </mc:Fallback>
   </mc:AlternateContent>
@@ -10074,7 +10043,7 @@
 </file>
 
 <file path=ppt/slides/slide15.xml><?xml version="1.0" encoding="utf-8"?>
-<p:sld xmlns:a="http://schemas.openxmlformats.org/drawingml/2006/main" xmlns:r="http://schemas.openxmlformats.org/officeDocument/2006/relationships" xmlns:p="http://schemas.openxmlformats.org/presentationml/2006/main">
+<p:sld xmlns:r="http://schemas.openxmlformats.org/officeDocument/2006/relationships" xmlns:c="http://schemas.openxmlformats.org/drawingml/2006/chart" xmlns:a="http://schemas.openxmlformats.org/drawingml/2006/main" xmlns:dgm="http://schemas.openxmlformats.org/drawingml/2006/diagram" xmlns:dsp="http://schemas.microsoft.com/office/drawing/2008/diagram" xmlns:p="http://schemas.openxmlformats.org/presentationml/2006/main">
   <p:cSld>
     <p:spTree>
       <p:nvGrpSpPr>
@@ -10097,7 +10066,7 @@
             <a:spLocks noGrp="1"/>
           </p:cNvSpPr>
           <p:nvPr>
-            <p:ph type="title"/>
+            <p:ph type="title" idx="0"/>
           </p:nvPr>
         </p:nvSpPr>
         <p:spPr>
@@ -10114,17 +10083,10 @@
               <a:defRPr/>
             </a:pPr>
             <a:r>
-              <a:rPr lang="ko-KR" altLang="en-US" dirty="0"/>
-              <a:t>웹 </a:t>
-            </a:r>
-            <a:r>
-              <a:rPr lang="ko-KR" altLang="en-US" dirty="0" err="1"/>
-              <a:t>크롤링</a:t>
-            </a:r>
-            <a:r>
-              <a:rPr lang="ko-KR" altLang="en-US" dirty="0"/>
-              <a:t> 응용</a:t>
-            </a:r>
+              <a:rPr lang="ko-KR" altLang="en-US"/>
+              <a:t>웹 크롤링 응용</a:t>
+            </a:r>
+            <a:endParaRPr lang="ko-KR" altLang="en-US"/>
           </a:p>
         </p:txBody>
       </p:sp>
@@ -10147,62 +10109,20 @@
               <a:buNone/>
               <a:defRPr/>
             </a:pPr>
-            <a:endParaRPr lang="ko-KR" altLang="en-US" dirty="0"/>
+            <a:endParaRPr lang="ko-KR" altLang="en-US"/>
           </a:p>
           <a:p>
             <a:pPr>
               <a:buNone/>
               <a:defRPr/>
             </a:pPr>
-            <a:endParaRPr lang="ko-KR" altLang="en-US" dirty="0"/>
-          </a:p>
-        </p:txBody>
-      </p:sp>
-      <p:pic>
-        <p:nvPicPr>
-          <p:cNvPr id="5" name="그림 4">
-            <a:extLst>
-              <a:ext uri="{FF2B5EF4-FFF2-40B4-BE49-F238E27FC236}">
-                <a16:creationId xmlns:a16="http://schemas.microsoft.com/office/drawing/2014/main" id="{8C5C4CC3-247F-41B5-1A2F-04A51090341E}"/>
-              </a:ext>
-            </a:extLst>
-          </p:cNvPr>
-          <p:cNvPicPr>
-            <a:picLocks noChangeAspect="1"/>
-          </p:cNvPicPr>
-          <p:nvPr/>
-        </p:nvPicPr>
-        <p:blipFill>
-          <a:blip r:embed="rId2">
-            <a:extLst>
-              <a:ext uri="{28A0092B-C50C-407E-A947-70E740481C1C}">
-                <a14:useLocalDpi xmlns:a14="http://schemas.microsoft.com/office/drawing/2010/main" val="0"/>
-              </a:ext>
-            </a:extLst>
-          </a:blip>
-          <a:stretch>
-            <a:fillRect/>
-          </a:stretch>
-        </p:blipFill>
-        <p:spPr>
-          <a:xfrm>
-            <a:off x="1461171" y="1876472"/>
-            <a:ext cx="5001323" cy="4582164"/>
-          </a:xfrm>
-          <a:prstGeom prst="rect">
-            <a:avLst/>
-          </a:prstGeom>
-        </p:spPr>
-      </p:pic>
-      <p:sp>
-        <p:nvSpPr>
-          <p:cNvPr id="6" name="TextBox 5">
-            <a:extLst>
-              <a:ext uri="{FF2B5EF4-FFF2-40B4-BE49-F238E27FC236}">
-                <a16:creationId xmlns:a16="http://schemas.microsoft.com/office/drawing/2014/main" id="{0C070DB5-0211-8A47-28C5-298520649D49}"/>
-              </a:ext>
-            </a:extLst>
-          </p:cNvPr>
+            <a:endParaRPr lang="ko-KR" altLang="en-US"/>
+          </a:p>
+        </p:txBody>
+      </p:sp>
+      <p:sp>
+        <p:nvSpPr>
+          <p:cNvPr id="6" name="TextBox 5"/>
           <p:cNvSpPr txBox="1"/>
           <p:nvPr/>
         </p:nvSpPr>
@@ -10217,27 +10137,92 @@
           <a:noFill/>
         </p:spPr>
         <p:txBody>
-          <a:bodyPr wrap="square" rtlCol="0">
+          <a:bodyPr wrap="square">
             <a:spAutoFit/>
           </a:bodyPr>
           <a:lstStyle/>
           <a:p>
-            <a:r>
-              <a:rPr lang="ko-KR" altLang="en-US" dirty="0"/>
+            <a:pPr lvl="0">
+              <a:defRPr/>
+            </a:pPr>
+            <a:r>
+              <a:rPr lang="ko-KR" altLang="en-US"/>
               <a:t>플라스크 라이브러리를 활용</a:t>
             </a:r>
-          </a:p>
-        </p:txBody>
-      </p:sp>
-      <p:sp>
-        <p:nvSpPr>
-          <p:cNvPr id="7" name="TextBox 6">
-            <a:extLst>
-              <a:ext uri="{FF2B5EF4-FFF2-40B4-BE49-F238E27FC236}">
-                <a16:creationId xmlns:a16="http://schemas.microsoft.com/office/drawing/2014/main" id="{C9E9D593-A0A2-78B3-0A69-D74C3D5A32BE}"/>
-              </a:ext>
-            </a:extLst>
-          </p:cNvPr>
+            <a:endParaRPr lang="ko-KR" altLang="en-US"/>
+          </a:p>
+        </p:txBody>
+      </p:sp>
+      <p:sp>
+        <p:nvSpPr>
+          <p:cNvPr id="10" name="TextBox 9"/>
+          <p:cNvSpPr txBox="1"/>
+          <p:nvPr/>
+        </p:nvSpPr>
+        <p:spPr>
+          <a:xfrm>
+            <a:off x="6767336" y="4926161"/>
+            <a:ext cx="2488224" cy="358309"/>
+          </a:xfrm>
+          <a:prstGeom prst="rect">
+            <a:avLst/>
+          </a:prstGeom>
+          <a:noFill/>
+        </p:spPr>
+        <p:txBody>
+          <a:bodyPr wrap="square">
+            <a:spAutoFit/>
+          </a:bodyPr>
+          <a:lstStyle/>
+          <a:p>
+            <a:pPr lvl="0">
+              <a:defRPr/>
+            </a:pPr>
+            <a:r>
+              <a:rPr lang="en-US" altLang="ko-KR">
+                <a:sym typeface="Wingdings"/>
+              </a:rPr>
+              <a:t></a:t>
+            </a:r>
+            <a:r>
+              <a:rPr lang="en-US" altLang="ko-KR"/>
+              <a:t>form </a:t>
+            </a:r>
+            <a:r>
+              <a:rPr lang="ko-KR" altLang="en-US"/>
+              <a:t>생성</a:t>
+            </a:r>
+            <a:endParaRPr lang="ko-KR" altLang="en-US"/>
+          </a:p>
+        </p:txBody>
+      </p:sp>
+      <p:pic>
+        <p:nvPicPr>
+          <p:cNvPr id="11" name=""/>
+          <p:cNvPicPr>
+            <a:picLocks noChangeAspect="1"/>
+          </p:cNvPicPr>
+          <p:nvPr/>
+        </p:nvPicPr>
+        <p:blipFill rotWithShape="1">
+          <a:blip r:embed="rId2"/>
+          <a:stretch>
+            <a:fillRect/>
+          </a:stretch>
+        </p:blipFill>
+        <p:spPr>
+          <a:xfrm>
+            <a:off x="1461171" y="1906917"/>
+            <a:ext cx="5306165" cy="4715533"/>
+          </a:xfrm>
+          <a:prstGeom prst="rect">
+            <a:avLst/>
+          </a:prstGeom>
+        </p:spPr>
+      </p:pic>
+      <p:sp>
+        <p:nvSpPr>
+          <p:cNvPr id="7" name="TextBox 6"/>
           <p:cNvSpPr txBox="1"/>
           <p:nvPr/>
         </p:nvSpPr>
@@ -10252,87 +10237,39 @@
           <a:noFill/>
         </p:spPr>
         <p:txBody>
-          <a:bodyPr wrap="square" rtlCol="0">
+          <a:bodyPr wrap="square">
             <a:spAutoFit/>
           </a:bodyPr>
           <a:lstStyle/>
           <a:p>
-            <a:r>
-              <a:rPr lang="en-US" altLang="ko-KR" dirty="0">
-                <a:sym typeface="Wingdings" panose="05000000000000000000" pitchFamily="2" charset="2"/>
+            <a:pPr lvl="0">
+              <a:defRPr/>
+            </a:pPr>
+            <a:r>
+              <a:rPr lang="en-US" altLang="ko-KR">
+                <a:sym typeface="Wingdings"/>
               </a:rPr>
-              <a:t>def </a:t>
-            </a:r>
-            <a:r>
-              <a:rPr lang="en-US" altLang="ko-KR" dirty="0" err="1">
-                <a:sym typeface="Wingdings" panose="05000000000000000000" pitchFamily="2" charset="2"/>
-              </a:rPr>
-              <a:t>dusrma</a:t>
-            </a:r>
-            <a:r>
-              <a:rPr lang="ko-KR" altLang="en-US" dirty="0">
-                <a:sym typeface="Wingdings" panose="05000000000000000000" pitchFamily="2" charset="2"/>
+              <a:t>def dusrma</a:t>
+            </a:r>
+            <a:r>
+              <a:rPr lang="ko-KR" altLang="en-US">
+                <a:sym typeface="Wingdings"/>
               </a:rPr>
               <a:t>을 </a:t>
             </a:r>
             <a:r>
-              <a:rPr lang="en-US" altLang="ko-KR" dirty="0">
-                <a:sym typeface="Wingdings" panose="05000000000000000000" pitchFamily="2" charset="2"/>
+              <a:rPr lang="en-US" altLang="ko-KR">
+                <a:sym typeface="Wingdings"/>
               </a:rPr>
               <a:t>ds</a:t>
             </a:r>
             <a:r>
-              <a:rPr lang="ko-KR" altLang="en-US" dirty="0">
-                <a:sym typeface="Wingdings" panose="05000000000000000000" pitchFamily="2" charset="2"/>
+              <a:rPr lang="ko-KR" altLang="en-US">
+                <a:sym typeface="Wingdings"/>
               </a:rPr>
               <a:t>로 지정</a:t>
             </a:r>
-            <a:endParaRPr lang="ko-KR" altLang="en-US" dirty="0"/>
-          </a:p>
-        </p:txBody>
-      </p:sp>
-      <p:sp>
-        <p:nvSpPr>
-          <p:cNvPr id="10" name="TextBox 9">
-            <a:extLst>
-              <a:ext uri="{FF2B5EF4-FFF2-40B4-BE49-F238E27FC236}">
-                <a16:creationId xmlns:a16="http://schemas.microsoft.com/office/drawing/2014/main" id="{28F26229-B6F6-17D1-F94D-D25C55C7AEBE}"/>
-              </a:ext>
-            </a:extLst>
-          </p:cNvPr>
-          <p:cNvSpPr txBox="1"/>
-          <p:nvPr/>
-        </p:nvSpPr>
-        <p:spPr>
-          <a:xfrm>
-            <a:off x="6576646" y="4809345"/>
-            <a:ext cx="2488223" cy="369332"/>
-          </a:xfrm>
-          <a:prstGeom prst="rect">
-            <a:avLst/>
-          </a:prstGeom>
-          <a:noFill/>
-        </p:spPr>
-        <p:txBody>
-          <a:bodyPr wrap="square" rtlCol="0">
-            <a:spAutoFit/>
-          </a:bodyPr>
-          <a:lstStyle/>
-          <a:p>
-            <a:r>
-              <a:rPr lang="en-US" altLang="ko-KR" dirty="0">
-                <a:sym typeface="Wingdings" panose="05000000000000000000" pitchFamily="2" charset="2"/>
-              </a:rPr>
-              <a:t></a:t>
-            </a:r>
-            <a:r>
-              <a:rPr lang="en-US" altLang="ko-KR" dirty="0"/>
-              <a:t>form </a:t>
-            </a:r>
-            <a:r>
-              <a:rPr lang="ko-KR" altLang="en-US" dirty="0"/>
-              <a:t>생성</a:t>
-            </a:r>
+            <a:endParaRPr lang="ko-KR" altLang="en-US"/>
           </a:p>
         </p:txBody>
       </p:sp>
@@ -10341,11 +10278,11 @@
   <p:clrMapOvr>
     <a:masterClrMapping/>
   </p:clrMapOvr>
-  <mc:AlternateContent xmlns:mc="http://schemas.openxmlformats.org/markup-compatibility/2006" xmlns:p14="http://schemas.microsoft.com/office/powerpoint/2010/main">
-    <mc:Choice Requires="p14">
-      <p:transition/>
+  <mc:AlternateContent xmlns:mc="http://schemas.openxmlformats.org/markup-compatibility/2006">
+    <mc:Choice xmlns:p14="http://schemas.microsoft.com/office/powerpoint/2010/main" Requires="p14">
+      <p:transition xmlns:mc="http://schemas.openxmlformats.org/markup-compatibility/2006" xmlns:p14="http://schemas.microsoft.com/office/powerpoint/2010/main" mc:Ignorable="p14" p14:dur="500"/>
     </mc:Choice>
-    <mc:Fallback xmlns="" xmlns:c="http://schemas.openxmlformats.org/drawingml/2006/chart" xmlns:dgm="http://schemas.openxmlformats.org/drawingml/2006/diagram" xmlns:dsp="http://schemas.microsoft.com/office/drawing/2008/diagram">
+    <mc:Fallback>
       <p:transition/>
     </mc:Fallback>
   </mc:AlternateContent>
@@ -11487,7 +11424,7 @@
 </file>
 
 <file path=ppt/slides/slide5.xml><?xml version="1.0" encoding="utf-8"?>
-<p:sld xmlns:a="http://schemas.openxmlformats.org/drawingml/2006/main" xmlns:r="http://schemas.openxmlformats.org/officeDocument/2006/relationships" xmlns:p="http://schemas.openxmlformats.org/presentationml/2006/main">
+<p:sld xmlns:r="http://schemas.openxmlformats.org/officeDocument/2006/relationships" xmlns:c="http://schemas.openxmlformats.org/drawingml/2006/chart" xmlns:a="http://schemas.openxmlformats.org/drawingml/2006/main" xmlns:dgm="http://schemas.openxmlformats.org/drawingml/2006/diagram" xmlns:dsp="http://schemas.microsoft.com/office/drawing/2008/diagram" xmlns:p="http://schemas.openxmlformats.org/presentationml/2006/main">
   <p:cSld>
     <p:spTree>
       <p:nvGrpSpPr>
@@ -11510,7 +11447,7 @@
             <a:spLocks noGrp="1"/>
           </p:cNvSpPr>
           <p:nvPr>
-            <p:ph type="title"/>
+            <p:ph type="title" idx="0"/>
           </p:nvPr>
         </p:nvSpPr>
         <p:spPr>
@@ -11527,57 +11464,16 @@
               <a:defRPr/>
             </a:pPr>
             <a:r>
-              <a:rPr lang="ko-KR" altLang="en-US" sz="2400" dirty="0"/>
+              <a:rPr lang="ko-KR" altLang="en-US" sz="2400"/>
               <a:t>분석 참고 자료</a:t>
             </a:r>
-          </a:p>
-        </p:txBody>
-      </p:sp>
-      <p:pic>
-        <p:nvPicPr>
-          <p:cNvPr id="5" name="그림 4">
-            <a:extLst>
-              <a:ext uri="{FF2B5EF4-FFF2-40B4-BE49-F238E27FC236}">
-                <a16:creationId xmlns:a16="http://schemas.microsoft.com/office/drawing/2014/main" id="{1EEDACC7-50E7-1618-3D09-707035F6DC18}"/>
-              </a:ext>
-            </a:extLst>
-          </p:cNvPr>
-          <p:cNvPicPr>
-            <a:picLocks noChangeAspect="1"/>
-          </p:cNvPicPr>
-          <p:nvPr/>
-        </p:nvPicPr>
-        <p:blipFill>
-          <a:blip r:embed="rId2">
-            <a:extLst>
-              <a:ext uri="{28A0092B-C50C-407E-A947-70E740481C1C}">
-                <a14:useLocalDpi xmlns:a14="http://schemas.microsoft.com/office/drawing/2010/main" val="0"/>
-              </a:ext>
-            </a:extLst>
-          </a:blip>
-          <a:stretch>
-            <a:fillRect/>
-          </a:stretch>
-        </p:blipFill>
-        <p:spPr>
-          <a:xfrm>
-            <a:off x="4135434" y="1521069"/>
-            <a:ext cx="4300544" cy="5336931"/>
-          </a:xfrm>
-          <a:prstGeom prst="rect">
-            <a:avLst/>
-          </a:prstGeom>
-        </p:spPr>
-      </p:pic>
-      <p:sp>
-        <p:nvSpPr>
-          <p:cNvPr id="6" name="TextBox 5">
-            <a:extLst>
-              <a:ext uri="{FF2B5EF4-FFF2-40B4-BE49-F238E27FC236}">
-                <a16:creationId xmlns:a16="http://schemas.microsoft.com/office/drawing/2014/main" id="{7BE125EA-5704-B2E4-3CD6-217524635252}"/>
-              </a:ext>
-            </a:extLst>
-          </p:cNvPr>
+            <a:endParaRPr lang="ko-KR" altLang="en-US" sz="2400"/>
+          </a:p>
+        </p:txBody>
+      </p:sp>
+      <p:sp>
+        <p:nvSpPr>
+          <p:cNvPr id="6" name="TextBox 5"/>
           <p:cNvSpPr txBox="1"/>
           <p:nvPr/>
         </p:nvSpPr>
@@ -11592,45 +11488,48 @@
           <a:noFill/>
         </p:spPr>
         <p:txBody>
-          <a:bodyPr wrap="square" rtlCol="0">
+          <a:bodyPr wrap="square">
             <a:spAutoFit/>
           </a:bodyPr>
           <a:lstStyle/>
           <a:p>
-            <a:r>
-              <a:rPr lang="ko-KR" altLang="en-US" dirty="0"/>
+            <a:pPr lvl="0">
+              <a:defRPr/>
+            </a:pPr>
+            <a:r>
+              <a:rPr lang="ko-KR" altLang="en-US"/>
               <a:t>국민연금공단 </a:t>
             </a:r>
-            <a:endParaRPr lang="en-US" altLang="ko-KR" dirty="0"/>
-          </a:p>
-          <a:p>
-            <a:r>
-              <a:rPr lang="ko-KR" altLang="en-US" dirty="0"/>
+            <a:endParaRPr lang="ko-KR" altLang="en-US"/>
+          </a:p>
+          <a:p>
+            <a:pPr lvl="0">
+              <a:defRPr/>
+            </a:pPr>
+            <a:r>
+              <a:rPr lang="ko-KR" altLang="en-US"/>
               <a:t>예상연금 간단계산</a:t>
             </a:r>
-            <a:endParaRPr lang="en-US" altLang="ko-KR" dirty="0"/>
-          </a:p>
-          <a:p>
-            <a:endParaRPr lang="ko-KR" altLang="en-US" dirty="0"/>
-          </a:p>
-        </p:txBody>
-      </p:sp>
-      <p:sp>
-        <p:nvSpPr>
-          <p:cNvPr id="7" name="TextBox 6">
-            <a:extLst>
-              <a:ext uri="{FF2B5EF4-FFF2-40B4-BE49-F238E27FC236}">
-                <a16:creationId xmlns:a16="http://schemas.microsoft.com/office/drawing/2014/main" id="{2A80868E-290F-C060-B6A0-F31C6F432F11}"/>
-              </a:ext>
-            </a:extLst>
-          </p:cNvPr>
+            <a:endParaRPr lang="ko-KR" altLang="en-US"/>
+          </a:p>
+          <a:p>
+            <a:pPr lvl="0">
+              <a:defRPr/>
+            </a:pPr>
+            <a:endParaRPr lang="ko-KR" altLang="en-US"/>
+          </a:p>
+        </p:txBody>
+      </p:sp>
+      <p:sp>
+        <p:nvSpPr>
+          <p:cNvPr id="7" name="TextBox 6"/>
           <p:cNvSpPr txBox="1"/>
           <p:nvPr/>
         </p:nvSpPr>
         <p:spPr>
           <a:xfrm>
             <a:off x="8620616" y="2455341"/>
-            <a:ext cx="3341077" cy="646331"/>
+            <a:ext cx="3341077" cy="638379"/>
           </a:xfrm>
           <a:prstGeom prst="rect">
             <a:avLst/>
@@ -11638,34 +11537,56 @@
           <a:noFill/>
         </p:spPr>
         <p:txBody>
-          <a:bodyPr wrap="square" rtlCol="0">
+          <a:bodyPr wrap="square">
             <a:spAutoFit/>
           </a:bodyPr>
           <a:lstStyle/>
           <a:p>
-            <a:r>
-              <a:rPr lang="en-US" altLang="ko-KR" dirty="0"/>
+            <a:pPr lvl="0">
+              <a:defRPr/>
+            </a:pPr>
+            <a:r>
+              <a:rPr lang="en-US" altLang="ko-KR"/>
               <a:t>https://www.nps.or.kr/jsppage/app/etc/simpleExpect.jsp</a:t>
             </a:r>
-            <a:endParaRPr lang="ko-KR" altLang="en-US" dirty="0"/>
-          </a:p>
-        </p:txBody>
-      </p:sp>
+            <a:endParaRPr lang="en-US" altLang="ko-KR"/>
+          </a:p>
+        </p:txBody>
+      </p:sp>
+      <p:pic>
+        <p:nvPicPr>
+          <p:cNvPr id="8" name=""/>
+          <p:cNvPicPr>
+            <a:picLocks noChangeAspect="1"/>
+          </p:cNvPicPr>
+          <p:nvPr/>
+        </p:nvPicPr>
+        <p:blipFill rotWithShape="1">
+          <a:blip r:embed="rId2"/>
+          <a:stretch>
+            <a:fillRect/>
+          </a:stretch>
+        </p:blipFill>
+        <p:spPr>
+          <a:xfrm>
+            <a:off x="4080111" y="1692712"/>
+            <a:ext cx="4411190" cy="5165288"/>
+          </a:xfrm>
+          <a:prstGeom prst="rect">
+            <a:avLst/>
+          </a:prstGeom>
+        </p:spPr>
+      </p:pic>
     </p:spTree>
-    <p:extLst>
-      <p:ext uri="{BB962C8B-B14F-4D97-AF65-F5344CB8AC3E}">
-        <p14:creationId xmlns:p14="http://schemas.microsoft.com/office/powerpoint/2010/main" val="230361058"/>
-      </p:ext>
-    </p:extLst>
   </p:cSld>
   <p:clrMapOvr>
     <a:masterClrMapping/>
   </p:clrMapOvr>
-  <mc:AlternateContent xmlns:mc="http://schemas.openxmlformats.org/markup-compatibility/2006" xmlns:p14="http://schemas.microsoft.com/office/powerpoint/2010/main">
-    <mc:Choice Requires="p14">
-      <p:transition/>
+  <mc:AlternateContent xmlns:mc="http://schemas.openxmlformats.org/markup-compatibility/2006">
+    <mc:Choice xmlns:p14="http://schemas.microsoft.com/office/powerpoint/2010/main" Requires="p14">
+      <p:transition xmlns:mc="http://schemas.openxmlformats.org/markup-compatibility/2006" xmlns:p14="http://schemas.microsoft.com/office/powerpoint/2010/main" mc:Ignorable="p14" p14:dur="500"/>
     </mc:Choice>
-    <mc:Fallback xmlns="" xmlns:c="http://schemas.openxmlformats.org/drawingml/2006/chart" xmlns:dgm="http://schemas.openxmlformats.org/drawingml/2006/diagram" xmlns:dsp="http://schemas.microsoft.com/office/drawing/2008/diagram">
+    <mc:Fallback>
       <p:transition/>
     </mc:Fallback>
   </mc:AlternateContent>
@@ -11673,7 +11594,7 @@
 </file>
 
 <file path=ppt/slides/slide6.xml><?xml version="1.0" encoding="utf-8"?>
-<p:sld xmlns:a="http://schemas.openxmlformats.org/drawingml/2006/main" xmlns:r="http://schemas.openxmlformats.org/officeDocument/2006/relationships" xmlns:p="http://schemas.openxmlformats.org/presentationml/2006/main">
+<p:sld xmlns:r="http://schemas.openxmlformats.org/officeDocument/2006/relationships" xmlns:c="http://schemas.openxmlformats.org/drawingml/2006/chart" xmlns:a="http://schemas.openxmlformats.org/drawingml/2006/main" xmlns:dgm="http://schemas.openxmlformats.org/drawingml/2006/diagram" xmlns:dsp="http://schemas.microsoft.com/office/drawing/2008/diagram" xmlns:p="http://schemas.openxmlformats.org/presentationml/2006/main">
   <p:cSld>
     <p:spTree>
       <p:nvGrpSpPr>
@@ -11696,7 +11617,7 @@
             <a:spLocks noGrp="1"/>
           </p:cNvSpPr>
           <p:nvPr>
-            <p:ph type="title"/>
+            <p:ph type="title" idx="0"/>
           </p:nvPr>
         </p:nvSpPr>
         <p:spPr/>
@@ -11711,6 +11632,7 @@
               <a:rPr lang="ko-KR" altLang="en-US"/>
               <a:t>웹 크롤링 코드</a:t>
             </a:r>
+            <a:endParaRPr lang="ko-KR" altLang="en-US"/>
           </a:p>
         </p:txBody>
       </p:sp>
@@ -11767,7 +11689,7 @@
           <a:p>
             <a:pPr marL="333000" indent="-333000">
               <a:buClr>
-                <a:srgbClr val="264C72"/>
+                <a:srgbClr val="264c72"/>
               </a:buClr>
               <a:buFont typeface="Wingdings"/>
               <a:buNone/>
@@ -11777,39 +11699,28 @@
               <a:rPr lang="ko-KR" altLang="en-US"/>
               <a:t> </a:t>
             </a:r>
+            <a:endParaRPr lang="ko-KR" altLang="en-US"/>
           </a:p>
         </p:txBody>
       </p:sp>
       <p:pic>
         <p:nvPicPr>
-          <p:cNvPr id="9" name="그림 8">
-            <a:extLst>
-              <a:ext uri="{FF2B5EF4-FFF2-40B4-BE49-F238E27FC236}">
-                <a16:creationId xmlns:a16="http://schemas.microsoft.com/office/drawing/2014/main" id="{706C85AE-1A54-26B3-83D3-45B69983C52D}"/>
-              </a:ext>
-            </a:extLst>
-          </p:cNvPr>
+          <p:cNvPr id="11" name=""/>
           <p:cNvPicPr>
             <a:picLocks noChangeAspect="1"/>
           </p:cNvPicPr>
           <p:nvPr/>
         </p:nvPicPr>
-        <p:blipFill>
-          <a:blip r:embed="rId2">
-            <a:extLst>
-              <a:ext uri="{28A0092B-C50C-407E-A947-70E740481C1C}">
-                <a14:useLocalDpi xmlns:a14="http://schemas.microsoft.com/office/drawing/2010/main" val="0"/>
-              </a:ext>
-            </a:extLst>
-          </a:blip>
+        <p:blipFill rotWithShape="1">
+          <a:blip r:embed="rId2"/>
           <a:stretch>
             <a:fillRect/>
           </a:stretch>
         </p:blipFill>
         <p:spPr>
           <a:xfrm>
-            <a:off x="0" y="1677424"/>
-            <a:ext cx="12192000" cy="4318930"/>
+            <a:off x="0" y="1251079"/>
+            <a:ext cx="12192000" cy="5017960"/>
           </a:xfrm>
           <a:prstGeom prst="rect">
             <a:avLst/>
@@ -11821,11 +11732,11 @@
   <p:clrMapOvr>
     <a:masterClrMapping/>
   </p:clrMapOvr>
-  <mc:AlternateContent xmlns:mc="http://schemas.openxmlformats.org/markup-compatibility/2006" xmlns:p14="http://schemas.microsoft.com/office/powerpoint/2010/main">
-    <mc:Choice Requires="p14">
-      <p:transition/>
+  <mc:AlternateContent xmlns:mc="http://schemas.openxmlformats.org/markup-compatibility/2006">
+    <mc:Choice xmlns:p14="http://schemas.microsoft.com/office/powerpoint/2010/main" Requires="p14">
+      <p:transition xmlns:mc="http://schemas.openxmlformats.org/markup-compatibility/2006" xmlns:p14="http://schemas.microsoft.com/office/powerpoint/2010/main" mc:Ignorable="p14" p14:dur="500"/>
     </mc:Choice>
-    <mc:Fallback xmlns="" xmlns:c="http://schemas.openxmlformats.org/drawingml/2006/chart" xmlns:dgm="http://schemas.openxmlformats.org/drawingml/2006/diagram" xmlns:dsp="http://schemas.microsoft.com/office/drawing/2008/diagram">
+    <mc:Fallback>
       <p:transition/>
     </mc:Fallback>
   </mc:AlternateContent>
@@ -11833,7 +11744,7 @@
 </file>
 
 <file path=ppt/slides/slide7.xml><?xml version="1.0" encoding="utf-8"?>
-<p:sld xmlns:a="http://schemas.openxmlformats.org/drawingml/2006/main" xmlns:r="http://schemas.openxmlformats.org/officeDocument/2006/relationships" xmlns:p="http://schemas.openxmlformats.org/presentationml/2006/main">
+<p:sld xmlns:r="http://schemas.openxmlformats.org/officeDocument/2006/relationships" xmlns:c="http://schemas.openxmlformats.org/drawingml/2006/chart" xmlns:a="http://schemas.openxmlformats.org/drawingml/2006/main" xmlns:dgm="http://schemas.openxmlformats.org/drawingml/2006/diagram" xmlns:dsp="http://schemas.microsoft.com/office/drawing/2008/diagram" xmlns:p="http://schemas.openxmlformats.org/presentationml/2006/main">
   <p:cSld>
     <p:spTree>
       <p:nvGrpSpPr>
@@ -11856,7 +11767,7 @@
             <a:spLocks noGrp="1"/>
           </p:cNvSpPr>
           <p:nvPr>
-            <p:ph type="title"/>
+            <p:ph type="title" idx="0"/>
           </p:nvPr>
         </p:nvSpPr>
         <p:spPr>
@@ -11876,6 +11787,7 @@
               <a:rPr lang="ko-KR" altLang="en-US"/>
               <a:t>웹 크롤링 상세</a:t>
             </a:r>
+            <a:endParaRPr lang="ko-KR" altLang="en-US"/>
           </a:p>
         </p:txBody>
       </p:sp>
@@ -11961,6 +11873,7 @@
               <a:rPr lang="ko-KR" altLang="en-US" sz="2400"/>
               <a:t> 라이브러리</a:t>
             </a:r>
+            <a:endParaRPr lang="ko-KR" altLang="en-US" sz="2400"/>
           </a:p>
         </p:txBody>
       </p:sp>
@@ -11996,6 +11909,7 @@
               <a:rPr lang="ko-KR" altLang="en-US"/>
               <a:t>웹페이지의 정보를 쉽게 스크랩할 수 있도록 사용</a:t>
             </a:r>
+            <a:endParaRPr lang="ko-KR" altLang="en-US"/>
           </a:p>
         </p:txBody>
       </p:sp>
@@ -12039,6 +11953,7 @@
               <a:rPr lang="ko-KR" altLang="en-US"/>
               <a:t>를 호출할때 사용</a:t>
             </a:r>
+            <a:endParaRPr lang="ko-KR" altLang="en-US"/>
           </a:p>
           <a:p>
             <a:pPr>
@@ -12052,6 +11967,7 @@
               <a:rPr lang="en-US" altLang="ko-KR"/>
               <a:t>ex)request.get()</a:t>
             </a:r>
+            <a:endParaRPr lang="en-US" altLang="ko-KR"/>
           </a:p>
         </p:txBody>
       </p:sp>
@@ -12095,12 +12011,61 @@
               <a:rPr lang="ko-KR" altLang="en-US" sz="2400"/>
               <a:t> 호출</a:t>
             </a:r>
+            <a:endParaRPr lang="ko-KR" altLang="en-US" sz="2400"/>
+          </a:p>
+        </p:txBody>
+      </p:sp>
+      <p:sp>
+        <p:nvSpPr>
+          <p:cNvPr id="11" name="TextBox 10"/>
+          <p:cNvSpPr txBox="1"/>
+          <p:nvPr/>
+        </p:nvSpPr>
+        <p:spPr>
+          <a:xfrm>
+            <a:off x="1380497" y="5500238"/>
+            <a:ext cx="7119218" cy="365256"/>
+          </a:xfrm>
+          <a:prstGeom prst="rect">
+            <a:avLst/>
+          </a:prstGeom>
+        </p:spPr>
+        <p:txBody>
+          <a:bodyPr wrap="square">
+            <a:spAutoFit/>
+          </a:bodyPr>
+          <a:lstStyle/>
+          <a:p>
+            <a:pPr>
+              <a:defRPr/>
+            </a:pPr>
+            <a:r>
+              <a:rPr lang="en-US" altLang="ko-KR"/>
+              <a:t>insu</a:t>
+            </a:r>
+            <a:r>
+              <a:rPr lang="ko-KR" altLang="en-US"/>
+              <a:t>는 소득기준 </a:t>
+            </a:r>
+            <a:r>
+              <a:rPr lang="en-US" altLang="ko-KR"/>
+              <a:t>100</a:t>
+            </a:r>
+            <a:r>
+              <a:rPr lang="ko-KR" altLang="en-US"/>
+              <a:t>만원을 기준 </a:t>
+            </a:r>
+            <a:r>
+              <a:rPr lang="en-US" altLang="ko-KR"/>
+              <a:t>90000</a:t>
+            </a:r>
+            <a:endParaRPr lang="ko-KR" altLang="en-US"/>
           </a:p>
         </p:txBody>
       </p:sp>
       <p:pic>
         <p:nvPicPr>
-          <p:cNvPr id="10" name="그림 9"/>
+          <p:cNvPr id="12" name=""/>
           <p:cNvPicPr>
             <a:picLocks noChangeAspect="1"/>
           </p:cNvPicPr>
@@ -12114,72 +12079,24 @@
         </p:blipFill>
         <p:spPr>
           <a:xfrm>
-            <a:off x="1380497" y="4446270"/>
-            <a:ext cx="10646434" cy="909971"/>
+            <a:off x="1380497" y="4577592"/>
+            <a:ext cx="10586856" cy="829892"/>
           </a:xfrm>
           <a:prstGeom prst="rect">
             <a:avLst/>
           </a:prstGeom>
         </p:spPr>
       </p:pic>
-      <p:sp>
-        <p:nvSpPr>
-          <p:cNvPr id="11" name="TextBox 10"/>
-          <p:cNvSpPr txBox="1"/>
-          <p:nvPr/>
-        </p:nvSpPr>
-        <p:spPr>
-          <a:xfrm>
-            <a:off x="1380497" y="5500238"/>
-            <a:ext cx="7119218" cy="365256"/>
-          </a:xfrm>
-          <a:prstGeom prst="rect">
-            <a:avLst/>
-          </a:prstGeom>
-        </p:spPr>
-        <p:txBody>
-          <a:bodyPr wrap="square">
-            <a:spAutoFit/>
-          </a:bodyPr>
-          <a:lstStyle/>
-          <a:p>
-            <a:pPr>
-              <a:defRPr/>
-            </a:pPr>
-            <a:r>
-              <a:rPr lang="en-US" altLang="ko-KR"/>
-              <a:t>insu</a:t>
-            </a:r>
-            <a:r>
-              <a:rPr lang="ko-KR" altLang="en-US"/>
-              <a:t>는 소득기준 </a:t>
-            </a:r>
-            <a:r>
-              <a:rPr lang="en-US" altLang="ko-KR"/>
-              <a:t>100</a:t>
-            </a:r>
-            <a:r>
-              <a:rPr lang="ko-KR" altLang="en-US"/>
-              <a:t>만원을 기준 </a:t>
-            </a:r>
-            <a:r>
-              <a:rPr lang="en-US" altLang="ko-KR"/>
-              <a:t>90000</a:t>
-            </a:r>
-            <a:endParaRPr lang="ko-KR" altLang="en-US"/>
-          </a:p>
-        </p:txBody>
-      </p:sp>
     </p:spTree>
   </p:cSld>
   <p:clrMapOvr>
     <a:masterClrMapping/>
   </p:clrMapOvr>
-  <mc:AlternateContent xmlns:mc="http://schemas.openxmlformats.org/markup-compatibility/2006" xmlns:p14="http://schemas.microsoft.com/office/powerpoint/2010/main">
-    <mc:Choice Requires="p14">
-      <p:transition/>
+  <mc:AlternateContent xmlns:mc="http://schemas.openxmlformats.org/markup-compatibility/2006">
+    <mc:Choice xmlns:p14="http://schemas.microsoft.com/office/powerpoint/2010/main" Requires="p14">
+      <p:transition xmlns:mc="http://schemas.openxmlformats.org/markup-compatibility/2006" xmlns:p14="http://schemas.microsoft.com/office/powerpoint/2010/main" mc:Ignorable="p14" p14:dur="500"/>
     </mc:Choice>
-    <mc:Fallback xmlns="" xmlns:c="http://schemas.openxmlformats.org/drawingml/2006/chart" xmlns:dgm="http://schemas.openxmlformats.org/drawingml/2006/diagram" xmlns:dsp="http://schemas.microsoft.com/office/drawing/2008/diagram">
+    <mc:Fallback>
       <p:transition/>
     </mc:Fallback>
   </mc:AlternateContent>
@@ -12187,7 +12104,7 @@
 </file>
 
 <file path=ppt/slides/slide8.xml><?xml version="1.0" encoding="utf-8"?>
-<p:sld xmlns:a="http://schemas.openxmlformats.org/drawingml/2006/main" xmlns:r="http://schemas.openxmlformats.org/officeDocument/2006/relationships" xmlns:p="http://schemas.openxmlformats.org/presentationml/2006/main">
+<p:sld xmlns:r="http://schemas.openxmlformats.org/officeDocument/2006/relationships" xmlns:c="http://schemas.openxmlformats.org/drawingml/2006/chart" xmlns:a="http://schemas.openxmlformats.org/drawingml/2006/main" xmlns:dgm="http://schemas.openxmlformats.org/drawingml/2006/diagram" xmlns:dsp="http://schemas.microsoft.com/office/drawing/2008/diagram" xmlns:p="http://schemas.openxmlformats.org/presentationml/2006/main">
   <p:cSld>
     <p:spTree>
       <p:nvGrpSpPr>
@@ -12210,7 +12127,7 @@
             <a:spLocks noGrp="1"/>
           </p:cNvSpPr>
           <p:nvPr>
-            <p:ph type="title"/>
+            <p:ph type="title" idx="0"/>
           </p:nvPr>
         </p:nvSpPr>
         <p:spPr>
@@ -12230,6 +12147,7 @@
               <a:rPr lang="ko-KR" altLang="en-US"/>
               <a:t>웹 크롤링 상세</a:t>
             </a:r>
+            <a:endParaRPr lang="ko-KR" altLang="en-US"/>
           </a:p>
         </p:txBody>
       </p:sp>
@@ -12263,9 +12181,83 @@
           </a:p>
         </p:txBody>
       </p:sp>
+      <p:sp>
+        <p:nvSpPr>
+          <p:cNvPr id="14" name="TextBox 13"/>
+          <p:cNvSpPr txBox="1"/>
+          <p:nvPr/>
+        </p:nvSpPr>
+        <p:spPr>
+          <a:xfrm>
+            <a:off x="313518" y="1610535"/>
+            <a:ext cx="4969175" cy="359235"/>
+          </a:xfrm>
+          <a:prstGeom prst="rect">
+            <a:avLst/>
+          </a:prstGeom>
+        </p:spPr>
+        <p:txBody>
+          <a:bodyPr wrap="square">
+            <a:spAutoFit/>
+          </a:bodyPr>
+          <a:lstStyle/>
+          <a:p>
+            <a:pPr>
+              <a:defRPr/>
+            </a:pPr>
+            <a:r>
+              <a:rPr lang="ko-KR" altLang="en-US"/>
+              <a:t>연도별 연금값  찾기</a:t>
+            </a:r>
+            <a:endParaRPr lang="ko-KR" altLang="en-US"/>
+          </a:p>
+        </p:txBody>
+      </p:sp>
+      <p:sp>
+        <p:nvSpPr>
+          <p:cNvPr id="15" name="TextBox 14"/>
+          <p:cNvSpPr txBox="1"/>
+          <p:nvPr/>
+        </p:nvSpPr>
+        <p:spPr>
+          <a:xfrm>
+            <a:off x="313518" y="4871229"/>
+            <a:ext cx="10720296" cy="641841"/>
+          </a:xfrm>
+          <a:prstGeom prst="rect">
+            <a:avLst/>
+          </a:prstGeom>
+        </p:spPr>
+        <p:txBody>
+          <a:bodyPr wrap="square">
+            <a:spAutoFit/>
+          </a:bodyPr>
+          <a:lstStyle/>
+          <a:p>
+            <a:pPr>
+              <a:defRPr/>
+            </a:pPr>
+            <a:r>
+              <a:rPr lang="ko-KR" altLang="en-US"/>
+              <a:t>select로 웹크롤링할때 원하는페이지에서 웹페이지 검사로 span.data에서 원하는 수치를 얻기위해서 </a:t>
+            </a:r>
+            <a:endParaRPr lang="ko-KR" altLang="en-US"/>
+          </a:p>
+          <a:p>
+            <a:pPr>
+              <a:defRPr/>
+            </a:pPr>
+            <a:r>
+              <a:rPr lang="ko-KR" altLang="en-US"/>
+              <a:t>span.data에서 크롤링하였다. string은 불필요한 태그가 나오는것을 방지하기 위해서 넣었다. </a:t>
+            </a:r>
+            <a:endParaRPr lang="ko-KR" altLang="en-US"/>
+          </a:p>
+        </p:txBody>
+      </p:sp>
       <p:pic>
         <p:nvPicPr>
-          <p:cNvPr id="13" name="그림 12"/>
+          <p:cNvPr id="16" name=""/>
           <p:cNvPicPr>
             <a:picLocks noChangeAspect="1"/>
           </p:cNvPicPr>
@@ -12279,150 +12271,24 @@
         </p:blipFill>
         <p:spPr>
           <a:xfrm>
-            <a:off x="313518" y="2102779"/>
-            <a:ext cx="10720296" cy="2149232"/>
+            <a:off x="313518" y="2057208"/>
+            <a:ext cx="7239733" cy="2445600"/>
           </a:xfrm>
           <a:prstGeom prst="rect">
             <a:avLst/>
           </a:prstGeom>
         </p:spPr>
       </p:pic>
-      <p:sp>
-        <p:nvSpPr>
-          <p:cNvPr id="14" name="TextBox 13"/>
-          <p:cNvSpPr txBox="1"/>
-          <p:nvPr/>
-        </p:nvSpPr>
-        <p:spPr>
-          <a:xfrm>
-            <a:off x="313518" y="1610535"/>
-            <a:ext cx="4969175" cy="359235"/>
-          </a:xfrm>
-          <a:prstGeom prst="rect">
-            <a:avLst/>
-          </a:prstGeom>
-        </p:spPr>
-        <p:txBody>
-          <a:bodyPr wrap="square">
-            <a:spAutoFit/>
-          </a:bodyPr>
-          <a:lstStyle/>
-          <a:p>
-            <a:pPr>
-              <a:defRPr/>
-            </a:pPr>
-            <a:r>
-              <a:rPr lang="ko-KR" altLang="en-US"/>
-              <a:t>연도별 연금값  찾기</a:t>
-            </a:r>
-          </a:p>
-        </p:txBody>
-      </p:sp>
-      <p:sp>
-        <p:nvSpPr>
-          <p:cNvPr id="15" name="TextBox 14"/>
-          <p:cNvSpPr txBox="1"/>
-          <p:nvPr/>
-        </p:nvSpPr>
-        <p:spPr>
-          <a:xfrm>
-            <a:off x="313518" y="4502809"/>
-            <a:ext cx="10720296" cy="646331"/>
-          </a:xfrm>
-          <a:prstGeom prst="rect">
-            <a:avLst/>
-          </a:prstGeom>
-        </p:spPr>
-        <p:txBody>
-          <a:bodyPr wrap="square">
-            <a:spAutoFit/>
-          </a:bodyPr>
-          <a:lstStyle/>
-          <a:p>
-            <a:pPr>
-              <a:defRPr/>
-            </a:pPr>
-            <a:r>
-              <a:rPr lang="ko-KR" altLang="en-US" dirty="0" err="1"/>
-              <a:t>html</a:t>
-            </a:r>
-            <a:r>
-              <a:rPr lang="ko-KR" altLang="en-US" dirty="0"/>
-              <a:t> 변수에 할당된 </a:t>
-            </a:r>
-            <a:r>
-              <a:rPr lang="ko-KR" altLang="en-US" dirty="0" err="1"/>
-              <a:t>BeautifulSoup</a:t>
-            </a:r>
-            <a:r>
-              <a:rPr lang="ko-KR" altLang="en-US" dirty="0"/>
-              <a:t> 객체 안에서 &lt;</a:t>
-            </a:r>
-            <a:r>
-              <a:rPr lang="ko-KR" altLang="en-US" dirty="0" err="1"/>
-              <a:t>dt</a:t>
-            </a:r>
-            <a:r>
-              <a:rPr lang="ko-KR" altLang="en-US" dirty="0"/>
-              <a:t>&gt; 태그 중 </a:t>
-            </a:r>
-            <a:r>
-              <a:rPr lang="ko-KR" altLang="en-US" dirty="0" err="1"/>
-              <a:t>class</a:t>
-            </a:r>
-            <a:r>
-              <a:rPr lang="ko-KR" altLang="en-US" dirty="0"/>
-              <a:t> 속성이 "th1_</a:t>
-            </a:r>
-            <a:r>
-              <a:rPr lang="en-US" altLang="ko-KR" dirty="0"/>
-              <a:t>()</a:t>
-            </a:r>
-            <a:r>
-              <a:rPr lang="ko-KR" altLang="en-US" dirty="0"/>
-              <a:t> </a:t>
-            </a:r>
-            <a:r>
-              <a:rPr lang="ko-KR" altLang="en-US" dirty="0" err="1"/>
-              <a:t>th</a:t>
-            </a:r>
-            <a:r>
-              <a:rPr lang="en-US" altLang="ko-KR" dirty="0"/>
-              <a:t>()</a:t>
-            </a:r>
-            <a:r>
-              <a:rPr lang="ko-KR" altLang="en-US" dirty="0"/>
-              <a:t>"인 태그를 찾고 태그의 다음 요소로 위치한 &lt;</a:t>
-            </a:r>
-            <a:r>
-              <a:rPr lang="ko-KR" altLang="en-US" dirty="0" err="1"/>
-              <a:t>dd</a:t>
-            </a:r>
-            <a:r>
-              <a:rPr lang="ko-KR" altLang="en-US" dirty="0"/>
-              <a:t>&gt; 태그를 찾은 후 그 안에 있는 &lt;</a:t>
-            </a:r>
-            <a:r>
-              <a:rPr lang="ko-KR" altLang="en-US" dirty="0" err="1"/>
-              <a:t>span</a:t>
-            </a:r>
-            <a:r>
-              <a:rPr lang="ko-KR" altLang="en-US" dirty="0"/>
-              <a:t>&gt; 태그를 찾아 그 안에 있는 값을 추출</a:t>
-            </a:r>
-          </a:p>
-        </p:txBody>
-      </p:sp>
     </p:spTree>
   </p:cSld>
   <p:clrMapOvr>
     <a:masterClrMapping/>
   </p:clrMapOvr>
-  <mc:AlternateContent xmlns:mc="http://schemas.openxmlformats.org/markup-compatibility/2006" xmlns:p14="http://schemas.microsoft.com/office/powerpoint/2010/main">
-    <mc:Choice Requires="p14">
-      <p:transition/>
+  <mc:AlternateContent xmlns:mc="http://schemas.openxmlformats.org/markup-compatibility/2006">
+    <mc:Choice xmlns:p14="http://schemas.microsoft.com/office/powerpoint/2010/main" Requires="p14">
+      <p:transition xmlns:mc="http://schemas.openxmlformats.org/markup-compatibility/2006" xmlns:p14="http://schemas.microsoft.com/office/powerpoint/2010/main" mc:Ignorable="p14" p14:dur="500"/>
     </mc:Choice>
-    <mc:Fallback xmlns="" xmlns:c="http://schemas.openxmlformats.org/drawingml/2006/chart" xmlns:dgm="http://schemas.openxmlformats.org/drawingml/2006/diagram" xmlns:dsp="http://schemas.microsoft.com/office/drawing/2008/diagram">
+    <mc:Fallback>
       <p:transition/>
     </mc:Fallback>
   </mc:AlternateContent>
@@ -12430,7 +12296,7 @@
 </file>
 
 <file path=ppt/slides/slide9.xml><?xml version="1.0" encoding="utf-8"?>
-<p:sld xmlns:a="http://schemas.openxmlformats.org/drawingml/2006/main" xmlns:r="http://schemas.openxmlformats.org/officeDocument/2006/relationships" xmlns:p="http://schemas.openxmlformats.org/presentationml/2006/main">
+<p:sld xmlns:r="http://schemas.openxmlformats.org/officeDocument/2006/relationships" xmlns:c="http://schemas.openxmlformats.org/drawingml/2006/chart" xmlns:a="http://schemas.openxmlformats.org/drawingml/2006/main" xmlns:dgm="http://schemas.openxmlformats.org/drawingml/2006/diagram" xmlns:dsp="http://schemas.microsoft.com/office/drawing/2008/diagram" xmlns:p="http://schemas.openxmlformats.org/presentationml/2006/main">
   <p:cSld>
     <p:spTree>
       <p:nvGrpSpPr>
@@ -12453,7 +12319,7 @@
             <a:spLocks noGrp="1"/>
           </p:cNvSpPr>
           <p:nvPr>
-            <p:ph type="title"/>
+            <p:ph type="title" idx="0"/>
           </p:nvPr>
         </p:nvSpPr>
         <p:spPr>
@@ -12473,6 +12339,7 @@
               <a:rPr lang="ko-KR" altLang="en-US"/>
               <a:t>웹 크롤링 상세</a:t>
             </a:r>
+            <a:endParaRPr lang="ko-KR" altLang="en-US"/>
           </a:p>
         </p:txBody>
       </p:sp>
@@ -12495,6 +12362,10 @@
               <a:buNone/>
               <a:defRPr/>
             </a:pPr>
+            <a:r>
+              <a:rPr lang="ko-KR" altLang="en-US"/>
+              <a:t/>
+            </a:r>
             <a:endParaRPr lang="ko-KR" altLang="en-US"/>
           </a:p>
         </p:txBody>
@@ -12527,6 +12398,7 @@
               <a:rPr lang="ko-KR" altLang="en-US"/>
               <a:t>연금값 출력</a:t>
             </a:r>
+            <a:endParaRPr lang="ko-KR" altLang="en-US"/>
           </a:p>
         </p:txBody>
       </p:sp>
@@ -12586,12 +12458,13 @@
               <a:rPr lang="en-US" altLang="ko-KR"/>
               <a:t>print</a:t>
             </a:r>
+            <a:endParaRPr lang="en-US" altLang="ko-KR"/>
           </a:p>
         </p:txBody>
       </p:sp>
       <p:pic>
         <p:nvPicPr>
-          <p:cNvPr id="17" name="그림 16"/>
+          <p:cNvPr id="18" name=""/>
           <p:cNvPicPr>
             <a:picLocks noChangeAspect="1"/>
           </p:cNvPicPr>
@@ -12605,8 +12478,8 @@
         </p:blipFill>
         <p:spPr>
           <a:xfrm>
-            <a:off x="1076816" y="4000511"/>
-            <a:ext cx="10566462" cy="663876"/>
+            <a:off x="1076816" y="3905584"/>
+            <a:ext cx="10719807" cy="682256"/>
           </a:xfrm>
           <a:prstGeom prst="rect">
             <a:avLst/>
@@ -12618,11 +12491,11 @@
   <p:clrMapOvr>
     <a:masterClrMapping/>
   </p:clrMapOvr>
-  <mc:AlternateContent xmlns:mc="http://schemas.openxmlformats.org/markup-compatibility/2006" xmlns:p14="http://schemas.microsoft.com/office/powerpoint/2010/main">
-    <mc:Choice Requires="p14">
-      <p:transition/>
+  <mc:AlternateContent xmlns:mc="http://schemas.openxmlformats.org/markup-compatibility/2006">
+    <mc:Choice xmlns:p14="http://schemas.microsoft.com/office/powerpoint/2010/main" Requires="p14">
+      <p:transition xmlns:mc="http://schemas.openxmlformats.org/markup-compatibility/2006" xmlns:p14="http://schemas.microsoft.com/office/powerpoint/2010/main" mc:Ignorable="p14" p14:dur="500"/>
     </mc:Choice>
-    <mc:Fallback xmlns="" xmlns:c="http://schemas.openxmlformats.org/drawingml/2006/chart" xmlns:dgm="http://schemas.openxmlformats.org/drawingml/2006/diagram" xmlns:dsp="http://schemas.microsoft.com/office/drawing/2008/diagram">
+    <mc:Fallback>
       <p:transition/>
     </mc:Fallback>
   </mc:AlternateContent>

</xml_diff>